<commit_message>
added new README figs
</commit_message>
<xml_diff>
--- a/docs/README_figure.pptx
+++ b/docs/README_figure.pptx
@@ -14,6 +14,7 @@
     <p:sldId id="262" r:id="rId8"/>
     <p:sldId id="264" r:id="rId9"/>
     <p:sldId id="265" r:id="rId10"/>
+    <p:sldId id="266" r:id="rId11"/>
   </p:sldIdLst>
   <p:sldSz cx="12192000" cy="6858000"/>
   <p:notesSz cx="6858000" cy="9144000"/>
@@ -267,7 +268,7 @@
           <a:p>
             <a:fld id="{551C74AF-EA75-4093-9F7A-C9D8EE346441}" type="datetimeFigureOut">
               <a:rPr lang="en-US" smtClean="0"/>
-              <a:t>3/1/2018</a:t>
+              <a:t>1/8/2020</a:t>
             </a:fld>
             <a:endParaRPr lang="en-US"/>
           </a:p>
@@ -465,7 +466,7 @@
           <a:p>
             <a:fld id="{551C74AF-EA75-4093-9F7A-C9D8EE346441}" type="datetimeFigureOut">
               <a:rPr lang="en-US" smtClean="0"/>
-              <a:t>3/1/2018</a:t>
+              <a:t>1/8/2020</a:t>
             </a:fld>
             <a:endParaRPr lang="en-US"/>
           </a:p>
@@ -673,7 +674,7 @@
           <a:p>
             <a:fld id="{551C74AF-EA75-4093-9F7A-C9D8EE346441}" type="datetimeFigureOut">
               <a:rPr lang="en-US" smtClean="0"/>
-              <a:t>3/1/2018</a:t>
+              <a:t>1/8/2020</a:t>
             </a:fld>
             <a:endParaRPr lang="en-US"/>
           </a:p>
@@ -871,7 +872,7 @@
           <a:p>
             <a:fld id="{551C74AF-EA75-4093-9F7A-C9D8EE346441}" type="datetimeFigureOut">
               <a:rPr lang="en-US" smtClean="0"/>
-              <a:t>3/1/2018</a:t>
+              <a:t>1/8/2020</a:t>
             </a:fld>
             <a:endParaRPr lang="en-US"/>
           </a:p>
@@ -1146,7 +1147,7 @@
           <a:p>
             <a:fld id="{551C74AF-EA75-4093-9F7A-C9D8EE346441}" type="datetimeFigureOut">
               <a:rPr lang="en-US" smtClean="0"/>
-              <a:t>3/1/2018</a:t>
+              <a:t>1/8/2020</a:t>
             </a:fld>
             <a:endParaRPr lang="en-US"/>
           </a:p>
@@ -1411,7 +1412,7 @@
           <a:p>
             <a:fld id="{551C74AF-EA75-4093-9F7A-C9D8EE346441}" type="datetimeFigureOut">
               <a:rPr lang="en-US" smtClean="0"/>
-              <a:t>3/1/2018</a:t>
+              <a:t>1/8/2020</a:t>
             </a:fld>
             <a:endParaRPr lang="en-US"/>
           </a:p>
@@ -1823,7 +1824,7 @@
           <a:p>
             <a:fld id="{551C74AF-EA75-4093-9F7A-C9D8EE346441}" type="datetimeFigureOut">
               <a:rPr lang="en-US" smtClean="0"/>
-              <a:t>3/1/2018</a:t>
+              <a:t>1/8/2020</a:t>
             </a:fld>
             <a:endParaRPr lang="en-US"/>
           </a:p>
@@ -1964,7 +1965,7 @@
           <a:p>
             <a:fld id="{551C74AF-EA75-4093-9F7A-C9D8EE346441}" type="datetimeFigureOut">
               <a:rPr lang="en-US" smtClean="0"/>
-              <a:t>3/1/2018</a:t>
+              <a:t>1/8/2020</a:t>
             </a:fld>
             <a:endParaRPr lang="en-US"/>
           </a:p>
@@ -2077,7 +2078,7 @@
           <a:p>
             <a:fld id="{551C74AF-EA75-4093-9F7A-C9D8EE346441}" type="datetimeFigureOut">
               <a:rPr lang="en-US" smtClean="0"/>
-              <a:t>3/1/2018</a:t>
+              <a:t>1/8/2020</a:t>
             </a:fld>
             <a:endParaRPr lang="en-US"/>
           </a:p>
@@ -2388,7 +2389,7 @@
           <a:p>
             <a:fld id="{551C74AF-EA75-4093-9F7A-C9D8EE346441}" type="datetimeFigureOut">
               <a:rPr lang="en-US" smtClean="0"/>
-              <a:t>3/1/2018</a:t>
+              <a:t>1/8/2020</a:t>
             </a:fld>
             <a:endParaRPr lang="en-US"/>
           </a:p>
@@ -2676,7 +2677,7 @@
           <a:p>
             <a:fld id="{551C74AF-EA75-4093-9F7A-C9D8EE346441}" type="datetimeFigureOut">
               <a:rPr lang="en-US" smtClean="0"/>
-              <a:t>3/1/2018</a:t>
+              <a:t>1/8/2020</a:t>
             </a:fld>
             <a:endParaRPr lang="en-US"/>
           </a:p>
@@ -2917,7 +2918,7 @@
           <a:p>
             <a:fld id="{551C74AF-EA75-4093-9F7A-C9D8EE346441}" type="datetimeFigureOut">
               <a:rPr lang="en-US" smtClean="0"/>
-              <a:t>3/1/2018</a:t>
+              <a:t>1/8/2020</a:t>
             </a:fld>
             <a:endParaRPr lang="en-US"/>
           </a:p>
@@ -3671,6 +3672,107 @@
     <p:extLst>
       <p:ext uri="{BB962C8B-B14F-4D97-AF65-F5344CB8AC3E}">
         <p14:creationId xmlns:p14="http://schemas.microsoft.com/office/powerpoint/2010/main" val="3432109037"/>
+      </p:ext>
+    </p:extLst>
+  </p:cSld>
+  <p:clrMapOvr>
+    <a:masterClrMapping/>
+  </p:clrMapOvr>
+</p:sld>
+</file>
+
+<file path=ppt/slides/slide10.xml><?xml version="1.0" encoding="utf-8"?>
+<p:sld xmlns:a="http://schemas.openxmlformats.org/drawingml/2006/main" xmlns:r="http://schemas.openxmlformats.org/officeDocument/2006/relationships" xmlns:p="http://schemas.openxmlformats.org/presentationml/2006/main">
+  <p:cSld>
+    <p:spTree>
+      <p:nvGrpSpPr>
+        <p:cNvPr id="1" name=""/>
+        <p:cNvGrpSpPr/>
+        <p:nvPr/>
+      </p:nvGrpSpPr>
+      <p:grpSpPr>
+        <a:xfrm>
+          <a:off x="0" y="0"/>
+          <a:ext cx="0" cy="0"/>
+          <a:chOff x="0" y="0"/>
+          <a:chExt cx="0" cy="0"/>
+        </a:xfrm>
+      </p:grpSpPr>
+      <p:pic>
+        <p:nvPicPr>
+          <p:cNvPr id="4" name="Picture 3">
+            <a:extLst>
+              <a:ext uri="{FF2B5EF4-FFF2-40B4-BE49-F238E27FC236}">
+                <a16:creationId xmlns:a16="http://schemas.microsoft.com/office/drawing/2014/main" id="{F83A04B6-29C3-4BEB-ACCA-A927BABC7833}"/>
+              </a:ext>
+            </a:extLst>
+          </p:cNvPr>
+          <p:cNvPicPr>
+            <a:picLocks noChangeAspect="1"/>
+          </p:cNvPicPr>
+          <p:nvPr/>
+        </p:nvPicPr>
+        <p:blipFill>
+          <a:blip r:embed="rId2"/>
+          <a:stretch>
+            <a:fillRect/>
+          </a:stretch>
+        </p:blipFill>
+        <p:spPr>
+          <a:xfrm>
+            <a:off x="1669614" y="430718"/>
+            <a:ext cx="8686516" cy="5737946"/>
+          </a:xfrm>
+          <a:prstGeom prst="rect">
+            <a:avLst/>
+          </a:prstGeom>
+        </p:spPr>
+      </p:pic>
+      <p:cxnSp>
+        <p:nvCxnSpPr>
+          <p:cNvPr id="7" name="Straight Arrow Connector 6">
+            <a:extLst>
+              <a:ext uri="{FF2B5EF4-FFF2-40B4-BE49-F238E27FC236}">
+                <a16:creationId xmlns:a16="http://schemas.microsoft.com/office/drawing/2014/main" id="{A40D6E2B-6E35-466D-961E-72369227EEAA}"/>
+              </a:ext>
+            </a:extLst>
+          </p:cNvPr>
+          <p:cNvCxnSpPr>
+            <a:cxnSpLocks/>
+          </p:cNvCxnSpPr>
+          <p:nvPr/>
+        </p:nvCxnSpPr>
+        <p:spPr>
+          <a:xfrm flipH="1">
+            <a:off x="2780146" y="554182"/>
+            <a:ext cx="480290" cy="267854"/>
+          </a:xfrm>
+          <a:prstGeom prst="straightConnector1">
+            <a:avLst/>
+          </a:prstGeom>
+          <a:ln w="57150">
+            <a:tailEnd type="triangle"/>
+          </a:ln>
+        </p:spPr>
+        <p:style>
+          <a:lnRef idx="2">
+            <a:schemeClr val="accent2"/>
+          </a:lnRef>
+          <a:fillRef idx="0">
+            <a:schemeClr val="accent2"/>
+          </a:fillRef>
+          <a:effectRef idx="1">
+            <a:schemeClr val="accent2"/>
+          </a:effectRef>
+          <a:fontRef idx="minor">
+            <a:schemeClr val="tx1"/>
+          </a:fontRef>
+        </p:style>
+      </p:cxnSp>
+    </p:spTree>
+    <p:extLst>
+      <p:ext uri="{BB962C8B-B14F-4D97-AF65-F5344CB8AC3E}">
+        <p14:creationId xmlns:p14="http://schemas.microsoft.com/office/powerpoint/2010/main" val="2956257448"/>
       </p:ext>
     </p:extLst>
   </p:cSld>

</xml_diff>

<commit_message>
added load data gif to readme
</commit_message>
<xml_diff>
--- a/docs/README_figure.pptx
+++ b/docs/README_figure.pptx
@@ -14,7 +14,13 @@
     <p:sldId id="262" r:id="rId8"/>
     <p:sldId id="264" r:id="rId9"/>
     <p:sldId id="265" r:id="rId10"/>
-    <p:sldId id="266" r:id="rId11"/>
+    <p:sldId id="269" r:id="rId11"/>
+    <p:sldId id="267" r:id="rId12"/>
+    <p:sldId id="266" r:id="rId13"/>
+    <p:sldId id="268" r:id="rId14"/>
+    <p:sldId id="270" r:id="rId15"/>
+    <p:sldId id="272" r:id="rId16"/>
+    <p:sldId id="271" r:id="rId17"/>
   </p:sldIdLst>
   <p:sldSz cx="12192000" cy="6858000"/>
   <p:notesSz cx="6858000" cy="9144000"/>
@@ -3698,12 +3704,75 @@
           <a:chExt cx="0" cy="0"/>
         </a:xfrm>
       </p:grpSpPr>
+      <p:sp>
+        <p:nvSpPr>
+          <p:cNvPr id="2" name="Title 1">
+            <a:extLst>
+              <a:ext uri="{FF2B5EF4-FFF2-40B4-BE49-F238E27FC236}">
+                <a16:creationId xmlns:a16="http://schemas.microsoft.com/office/drawing/2014/main" id="{437335C1-6D99-4FED-89EB-4B556AFCE12B}"/>
+              </a:ext>
+            </a:extLst>
+          </p:cNvPr>
+          <p:cNvSpPr>
+            <a:spLocks noGrp="1"/>
+          </p:cNvSpPr>
+          <p:nvPr>
+            <p:ph type="title"/>
+          </p:nvPr>
+        </p:nvSpPr>
+        <p:spPr>
+          <a:xfrm>
+            <a:off x="4411980" y="2766218"/>
+            <a:ext cx="3368040" cy="1325563"/>
+          </a:xfrm>
+        </p:spPr>
+        <p:txBody>
+          <a:bodyPr/>
+          <a:lstStyle/>
+          <a:p>
+            <a:r>
+              <a:rPr lang="en-US" dirty="0"/>
+              <a:t>Gif 1 Images:</a:t>
+            </a:r>
+          </a:p>
+        </p:txBody>
+      </p:sp>
+    </p:spTree>
+    <p:extLst>
+      <p:ext uri="{BB962C8B-B14F-4D97-AF65-F5344CB8AC3E}">
+        <p14:creationId xmlns:p14="http://schemas.microsoft.com/office/powerpoint/2010/main" val="628950660"/>
+      </p:ext>
+    </p:extLst>
+  </p:cSld>
+  <p:clrMapOvr>
+    <a:masterClrMapping/>
+  </p:clrMapOvr>
+</p:sld>
+</file>
+
+<file path=ppt/slides/slide11.xml><?xml version="1.0" encoding="utf-8"?>
+<p:sld xmlns:a="http://schemas.openxmlformats.org/drawingml/2006/main" xmlns:r="http://schemas.openxmlformats.org/officeDocument/2006/relationships" xmlns:p="http://schemas.openxmlformats.org/presentationml/2006/main">
+  <p:cSld>
+    <p:spTree>
+      <p:nvGrpSpPr>
+        <p:cNvPr id="1" name=""/>
+        <p:cNvGrpSpPr/>
+        <p:nvPr/>
+      </p:nvGrpSpPr>
+      <p:grpSpPr>
+        <a:xfrm>
+          <a:off x="0" y="0"/>
+          <a:ext cx="0" cy="0"/>
+          <a:chOff x="0" y="0"/>
+          <a:chExt cx="0" cy="0"/>
+        </a:xfrm>
+      </p:grpSpPr>
       <p:pic>
         <p:nvPicPr>
           <p:cNvPr id="4" name="Picture 3">
             <a:extLst>
               <a:ext uri="{FF2B5EF4-FFF2-40B4-BE49-F238E27FC236}">
-                <a16:creationId xmlns:a16="http://schemas.microsoft.com/office/drawing/2014/main" id="{F83A04B6-29C3-4BEB-ACCA-A927BABC7833}"/>
+                <a16:creationId xmlns:a16="http://schemas.microsoft.com/office/drawing/2014/main" id="{99523982-47E8-41B3-BAEC-296388F96E5F}"/>
               </a:ext>
             </a:extLst>
           </p:cNvPr>
@@ -3720,59 +3789,318 @@
         </p:blipFill>
         <p:spPr>
           <a:xfrm>
-            <a:off x="1669614" y="430718"/>
-            <a:ext cx="8686516" cy="5737946"/>
+            <a:off x="923650" y="0"/>
+            <a:ext cx="10344699" cy="6858000"/>
           </a:xfrm>
           <a:prstGeom prst="rect">
             <a:avLst/>
           </a:prstGeom>
         </p:spPr>
       </p:pic>
-      <p:cxnSp>
-        <p:nvCxnSpPr>
-          <p:cNvPr id="7" name="Straight Arrow Connector 6">
-            <a:extLst>
-              <a:ext uri="{FF2B5EF4-FFF2-40B4-BE49-F238E27FC236}">
-                <a16:creationId xmlns:a16="http://schemas.microsoft.com/office/drawing/2014/main" id="{A40D6E2B-6E35-466D-961E-72369227EEAA}"/>
-              </a:ext>
-            </a:extLst>
-          </p:cNvPr>
-          <p:cNvCxnSpPr>
-            <a:cxnSpLocks/>
-          </p:cNvCxnSpPr>
+    </p:spTree>
+    <p:extLst>
+      <p:ext uri="{BB962C8B-B14F-4D97-AF65-F5344CB8AC3E}">
+        <p14:creationId xmlns:p14="http://schemas.microsoft.com/office/powerpoint/2010/main" val="1049254543"/>
+      </p:ext>
+    </p:extLst>
+  </p:cSld>
+  <p:clrMapOvr>
+    <a:masterClrMapping/>
+  </p:clrMapOvr>
+</p:sld>
+</file>
+
+<file path=ppt/slides/slide12.xml><?xml version="1.0" encoding="utf-8"?>
+<p:sld xmlns:a="http://schemas.openxmlformats.org/drawingml/2006/main" xmlns:r="http://schemas.openxmlformats.org/officeDocument/2006/relationships" xmlns:p="http://schemas.openxmlformats.org/presentationml/2006/main">
+  <p:cSld>
+    <p:spTree>
+      <p:nvGrpSpPr>
+        <p:cNvPr id="1" name=""/>
+        <p:cNvGrpSpPr/>
+        <p:nvPr/>
+      </p:nvGrpSpPr>
+      <p:grpSpPr>
+        <a:xfrm>
+          <a:off x="0" y="0"/>
+          <a:ext cx="0" cy="0"/>
+          <a:chOff x="0" y="0"/>
+          <a:chExt cx="0" cy="0"/>
+        </a:xfrm>
+      </p:grpSpPr>
+      <p:pic>
+        <p:nvPicPr>
+          <p:cNvPr id="16" name="Picture 15">
+            <a:extLst>
+              <a:ext uri="{FF2B5EF4-FFF2-40B4-BE49-F238E27FC236}">
+                <a16:creationId xmlns:a16="http://schemas.microsoft.com/office/drawing/2014/main" id="{A5210D7E-B6A4-4583-940B-100C87AAAD38}"/>
+              </a:ext>
+            </a:extLst>
+          </p:cNvPr>
+          <p:cNvPicPr>
+            <a:picLocks noChangeAspect="1"/>
+          </p:cNvPicPr>
           <p:nvPr/>
-        </p:nvCxnSpPr>
+        </p:nvPicPr>
+        <p:blipFill>
+          <a:blip r:embed="rId2"/>
+          <a:stretch>
+            <a:fillRect/>
+          </a:stretch>
+        </p:blipFill>
         <p:spPr>
-          <a:xfrm flipH="1">
-            <a:off x="2780146" y="554182"/>
-            <a:ext cx="480290" cy="267854"/>
+          <a:xfrm>
+            <a:off x="923650" y="0"/>
+            <a:ext cx="10344699" cy="6858000"/>
           </a:xfrm>
-          <a:prstGeom prst="straightConnector1">
+          <a:prstGeom prst="rect">
             <a:avLst/>
           </a:prstGeom>
-          <a:ln w="57150">
-            <a:tailEnd type="triangle"/>
-          </a:ln>
         </p:spPr>
-        <p:style>
-          <a:lnRef idx="2">
-            <a:schemeClr val="accent2"/>
-          </a:lnRef>
-          <a:fillRef idx="0">
-            <a:schemeClr val="accent2"/>
-          </a:fillRef>
-          <a:effectRef idx="1">
-            <a:schemeClr val="accent2"/>
-          </a:effectRef>
-          <a:fontRef idx="minor">
-            <a:schemeClr val="tx1"/>
-          </a:fontRef>
-        </p:style>
-      </p:cxnSp>
+      </p:pic>
     </p:spTree>
     <p:extLst>
       <p:ext uri="{BB962C8B-B14F-4D97-AF65-F5344CB8AC3E}">
         <p14:creationId xmlns:p14="http://schemas.microsoft.com/office/powerpoint/2010/main" val="2956257448"/>
+      </p:ext>
+    </p:extLst>
+  </p:cSld>
+  <p:clrMapOvr>
+    <a:masterClrMapping/>
+  </p:clrMapOvr>
+</p:sld>
+</file>
+
+<file path=ppt/slides/slide13.xml><?xml version="1.0" encoding="utf-8"?>
+<p:sld xmlns:a="http://schemas.openxmlformats.org/drawingml/2006/main" xmlns:r="http://schemas.openxmlformats.org/officeDocument/2006/relationships" xmlns:p="http://schemas.openxmlformats.org/presentationml/2006/main">
+  <p:cSld>
+    <p:spTree>
+      <p:nvGrpSpPr>
+        <p:cNvPr id="1" name=""/>
+        <p:cNvGrpSpPr/>
+        <p:nvPr/>
+      </p:nvGrpSpPr>
+      <p:grpSpPr>
+        <a:xfrm>
+          <a:off x="0" y="0"/>
+          <a:ext cx="0" cy="0"/>
+          <a:chOff x="0" y="0"/>
+          <a:chExt cx="0" cy="0"/>
+        </a:xfrm>
+      </p:grpSpPr>
+      <p:pic>
+        <p:nvPicPr>
+          <p:cNvPr id="4" name="Picture 3">
+            <a:extLst>
+              <a:ext uri="{FF2B5EF4-FFF2-40B4-BE49-F238E27FC236}">
+                <a16:creationId xmlns:a16="http://schemas.microsoft.com/office/drawing/2014/main" id="{5BE5B2B8-0F9D-4CAF-9C92-293B6C27BDBD}"/>
+              </a:ext>
+            </a:extLst>
+          </p:cNvPr>
+          <p:cNvPicPr>
+            <a:picLocks noChangeAspect="1"/>
+          </p:cNvPicPr>
+          <p:nvPr/>
+        </p:nvPicPr>
+        <p:blipFill>
+          <a:blip r:embed="rId2"/>
+          <a:stretch>
+            <a:fillRect/>
+          </a:stretch>
+        </p:blipFill>
+        <p:spPr>
+          <a:xfrm>
+            <a:off x="923650" y="0"/>
+            <a:ext cx="10344699" cy="6858000"/>
+          </a:xfrm>
+          <a:prstGeom prst="rect">
+            <a:avLst/>
+          </a:prstGeom>
+        </p:spPr>
+      </p:pic>
+    </p:spTree>
+    <p:extLst>
+      <p:ext uri="{BB962C8B-B14F-4D97-AF65-F5344CB8AC3E}">
+        <p14:creationId xmlns:p14="http://schemas.microsoft.com/office/powerpoint/2010/main" val="3817354509"/>
+      </p:ext>
+    </p:extLst>
+  </p:cSld>
+  <p:clrMapOvr>
+    <a:masterClrMapping/>
+  </p:clrMapOvr>
+</p:sld>
+</file>
+
+<file path=ppt/slides/slide14.xml><?xml version="1.0" encoding="utf-8"?>
+<p:sld xmlns:a="http://schemas.openxmlformats.org/drawingml/2006/main" xmlns:r="http://schemas.openxmlformats.org/officeDocument/2006/relationships" xmlns:p="http://schemas.openxmlformats.org/presentationml/2006/main">
+  <p:cSld>
+    <p:spTree>
+      <p:nvGrpSpPr>
+        <p:cNvPr id="1" name=""/>
+        <p:cNvGrpSpPr/>
+        <p:nvPr/>
+      </p:nvGrpSpPr>
+      <p:grpSpPr>
+        <a:xfrm>
+          <a:off x="0" y="0"/>
+          <a:ext cx="0" cy="0"/>
+          <a:chOff x="0" y="0"/>
+          <a:chExt cx="0" cy="0"/>
+        </a:xfrm>
+      </p:grpSpPr>
+      <p:pic>
+        <p:nvPicPr>
+          <p:cNvPr id="5" name="Picture 4">
+            <a:extLst>
+              <a:ext uri="{FF2B5EF4-FFF2-40B4-BE49-F238E27FC236}">
+                <a16:creationId xmlns:a16="http://schemas.microsoft.com/office/drawing/2014/main" id="{AA980824-E970-49A4-BC49-AC1CECA32EDC}"/>
+              </a:ext>
+            </a:extLst>
+          </p:cNvPr>
+          <p:cNvPicPr>
+            <a:picLocks noChangeAspect="1"/>
+          </p:cNvPicPr>
+          <p:nvPr/>
+        </p:nvPicPr>
+        <p:blipFill>
+          <a:blip r:embed="rId2"/>
+          <a:stretch>
+            <a:fillRect/>
+          </a:stretch>
+        </p:blipFill>
+        <p:spPr>
+          <a:xfrm>
+            <a:off x="940165" y="0"/>
+            <a:ext cx="10311669" cy="6858000"/>
+          </a:xfrm>
+          <a:prstGeom prst="rect">
+            <a:avLst/>
+          </a:prstGeom>
+        </p:spPr>
+      </p:pic>
+    </p:spTree>
+    <p:extLst>
+      <p:ext uri="{BB962C8B-B14F-4D97-AF65-F5344CB8AC3E}">
+        <p14:creationId xmlns:p14="http://schemas.microsoft.com/office/powerpoint/2010/main" val="3748575962"/>
+      </p:ext>
+    </p:extLst>
+  </p:cSld>
+  <p:clrMapOvr>
+    <a:masterClrMapping/>
+  </p:clrMapOvr>
+</p:sld>
+</file>
+
+<file path=ppt/slides/slide15.xml><?xml version="1.0" encoding="utf-8"?>
+<p:sld xmlns:a="http://schemas.openxmlformats.org/drawingml/2006/main" xmlns:r="http://schemas.openxmlformats.org/officeDocument/2006/relationships" xmlns:p="http://schemas.openxmlformats.org/presentationml/2006/main">
+  <p:cSld>
+    <p:spTree>
+      <p:nvGrpSpPr>
+        <p:cNvPr id="1" name=""/>
+        <p:cNvGrpSpPr/>
+        <p:nvPr/>
+      </p:nvGrpSpPr>
+      <p:grpSpPr>
+        <a:xfrm>
+          <a:off x="0" y="0"/>
+          <a:ext cx="0" cy="0"/>
+          <a:chOff x="0" y="0"/>
+          <a:chExt cx="0" cy="0"/>
+        </a:xfrm>
+      </p:grpSpPr>
+      <p:pic>
+        <p:nvPicPr>
+          <p:cNvPr id="4" name="Picture 3">
+            <a:extLst>
+              <a:ext uri="{FF2B5EF4-FFF2-40B4-BE49-F238E27FC236}">
+                <a16:creationId xmlns:a16="http://schemas.microsoft.com/office/drawing/2014/main" id="{376C2AA9-05F2-4A0A-9B8F-60C07B76A50A}"/>
+              </a:ext>
+            </a:extLst>
+          </p:cNvPr>
+          <p:cNvPicPr>
+            <a:picLocks noChangeAspect="1"/>
+          </p:cNvPicPr>
+          <p:nvPr/>
+        </p:nvPicPr>
+        <p:blipFill>
+          <a:blip r:embed="rId2"/>
+          <a:stretch>
+            <a:fillRect/>
+          </a:stretch>
+        </p:blipFill>
+        <p:spPr>
+          <a:xfrm>
+            <a:off x="940165" y="0"/>
+            <a:ext cx="10311669" cy="6858000"/>
+          </a:xfrm>
+          <a:prstGeom prst="rect">
+            <a:avLst/>
+          </a:prstGeom>
+        </p:spPr>
+      </p:pic>
+    </p:spTree>
+    <p:extLst>
+      <p:ext uri="{BB962C8B-B14F-4D97-AF65-F5344CB8AC3E}">
+        <p14:creationId xmlns:p14="http://schemas.microsoft.com/office/powerpoint/2010/main" val="967768288"/>
+      </p:ext>
+    </p:extLst>
+  </p:cSld>
+  <p:clrMapOvr>
+    <a:masterClrMapping/>
+  </p:clrMapOvr>
+</p:sld>
+</file>
+
+<file path=ppt/slides/slide16.xml><?xml version="1.0" encoding="utf-8"?>
+<p:sld xmlns:a="http://schemas.openxmlformats.org/drawingml/2006/main" xmlns:r="http://schemas.openxmlformats.org/officeDocument/2006/relationships" xmlns:p="http://schemas.openxmlformats.org/presentationml/2006/main">
+  <p:cSld>
+    <p:spTree>
+      <p:nvGrpSpPr>
+        <p:cNvPr id="1" name=""/>
+        <p:cNvGrpSpPr/>
+        <p:nvPr/>
+      </p:nvGrpSpPr>
+      <p:grpSpPr>
+        <a:xfrm>
+          <a:off x="0" y="0"/>
+          <a:ext cx="0" cy="0"/>
+          <a:chOff x="0" y="0"/>
+          <a:chExt cx="0" cy="0"/>
+        </a:xfrm>
+      </p:grpSpPr>
+      <p:pic>
+        <p:nvPicPr>
+          <p:cNvPr id="5" name="Picture 4">
+            <a:extLst>
+              <a:ext uri="{FF2B5EF4-FFF2-40B4-BE49-F238E27FC236}">
+                <a16:creationId xmlns:a16="http://schemas.microsoft.com/office/drawing/2014/main" id="{67FCCEC6-D34A-46EC-B58D-F44894D47C4D}"/>
+              </a:ext>
+            </a:extLst>
+          </p:cNvPr>
+          <p:cNvPicPr>
+            <a:picLocks noChangeAspect="1"/>
+          </p:cNvPicPr>
+          <p:nvPr/>
+        </p:nvPicPr>
+        <p:blipFill>
+          <a:blip r:embed="rId2"/>
+          <a:stretch>
+            <a:fillRect/>
+          </a:stretch>
+        </p:blipFill>
+        <p:spPr>
+          <a:xfrm>
+            <a:off x="923650" y="0"/>
+            <a:ext cx="10344699" cy="6858000"/>
+          </a:xfrm>
+          <a:prstGeom prst="rect">
+            <a:avLst/>
+          </a:prstGeom>
+        </p:spPr>
+      </p:pic>
+    </p:spTree>
+    <p:extLst>
+      <p:ext uri="{BB962C8B-B14F-4D97-AF65-F5344CB8AC3E}">
+        <p14:creationId xmlns:p14="http://schemas.microsoft.com/office/powerpoint/2010/main" val="2553201230"/>
       </p:ext>
     </p:extLst>
   </p:cSld>

</xml_diff>